<commit_message>
adding first batch of results
</commit_message>
<xml_diff>
--- a/extra_material/exp_plan.pptx
+++ b/extra_material/exp_plan.pptx
@@ -262,7 +262,7 @@
           <a:p>
             <a:fld id="{D9DFC112-CD81-6544-BC9B-69B280E44EE3}" type="datetimeFigureOut">
               <a:rPr lang="it-IT" smtClean="0"/>
-              <a:t>07/03/25</a:t>
+              <a:t>10/03/25</a:t>
             </a:fld>
             <a:endParaRPr lang="it-IT"/>
           </a:p>
@@ -460,7 +460,7 @@
           <a:p>
             <a:fld id="{D9DFC112-CD81-6544-BC9B-69B280E44EE3}" type="datetimeFigureOut">
               <a:rPr lang="it-IT" smtClean="0"/>
-              <a:t>07/03/25</a:t>
+              <a:t>10/03/25</a:t>
             </a:fld>
             <a:endParaRPr lang="it-IT"/>
           </a:p>
@@ -668,7 +668,7 @@
           <a:p>
             <a:fld id="{D9DFC112-CD81-6544-BC9B-69B280E44EE3}" type="datetimeFigureOut">
               <a:rPr lang="it-IT" smtClean="0"/>
-              <a:t>07/03/25</a:t>
+              <a:t>10/03/25</a:t>
             </a:fld>
             <a:endParaRPr lang="it-IT"/>
           </a:p>
@@ -866,7 +866,7 @@
           <a:p>
             <a:fld id="{D9DFC112-CD81-6544-BC9B-69B280E44EE3}" type="datetimeFigureOut">
               <a:rPr lang="it-IT" smtClean="0"/>
-              <a:t>07/03/25</a:t>
+              <a:t>10/03/25</a:t>
             </a:fld>
             <a:endParaRPr lang="it-IT"/>
           </a:p>
@@ -1141,7 +1141,7 @@
           <a:p>
             <a:fld id="{D9DFC112-CD81-6544-BC9B-69B280E44EE3}" type="datetimeFigureOut">
               <a:rPr lang="it-IT" smtClean="0"/>
-              <a:t>07/03/25</a:t>
+              <a:t>10/03/25</a:t>
             </a:fld>
             <a:endParaRPr lang="it-IT"/>
           </a:p>
@@ -1406,7 +1406,7 @@
           <a:p>
             <a:fld id="{D9DFC112-CD81-6544-BC9B-69B280E44EE3}" type="datetimeFigureOut">
               <a:rPr lang="it-IT" smtClean="0"/>
-              <a:t>07/03/25</a:t>
+              <a:t>10/03/25</a:t>
             </a:fld>
             <a:endParaRPr lang="it-IT"/>
           </a:p>
@@ -1818,7 +1818,7 @@
           <a:p>
             <a:fld id="{D9DFC112-CD81-6544-BC9B-69B280E44EE3}" type="datetimeFigureOut">
               <a:rPr lang="it-IT" smtClean="0"/>
-              <a:t>07/03/25</a:t>
+              <a:t>10/03/25</a:t>
             </a:fld>
             <a:endParaRPr lang="it-IT"/>
           </a:p>
@@ -1959,7 +1959,7 @@
           <a:p>
             <a:fld id="{D9DFC112-CD81-6544-BC9B-69B280E44EE3}" type="datetimeFigureOut">
               <a:rPr lang="it-IT" smtClean="0"/>
-              <a:t>07/03/25</a:t>
+              <a:t>10/03/25</a:t>
             </a:fld>
             <a:endParaRPr lang="it-IT"/>
           </a:p>
@@ -2072,7 +2072,7 @@
           <a:p>
             <a:fld id="{D9DFC112-CD81-6544-BC9B-69B280E44EE3}" type="datetimeFigureOut">
               <a:rPr lang="it-IT" smtClean="0"/>
-              <a:t>07/03/25</a:t>
+              <a:t>10/03/25</a:t>
             </a:fld>
             <a:endParaRPr lang="it-IT"/>
           </a:p>
@@ -2383,7 +2383,7 @@
           <a:p>
             <a:fld id="{D9DFC112-CD81-6544-BC9B-69B280E44EE3}" type="datetimeFigureOut">
               <a:rPr lang="it-IT" smtClean="0"/>
-              <a:t>07/03/25</a:t>
+              <a:t>10/03/25</a:t>
             </a:fld>
             <a:endParaRPr lang="it-IT"/>
           </a:p>
@@ -2671,7 +2671,7 @@
           <a:p>
             <a:fld id="{D9DFC112-CD81-6544-BC9B-69B280E44EE3}" type="datetimeFigureOut">
               <a:rPr lang="it-IT" smtClean="0"/>
-              <a:t>07/03/25</a:t>
+              <a:t>10/03/25</a:t>
             </a:fld>
             <a:endParaRPr lang="it-IT"/>
           </a:p>
@@ -2912,7 +2912,7 @@
           <a:p>
             <a:fld id="{D9DFC112-CD81-6544-BC9B-69B280E44EE3}" type="datetimeFigureOut">
               <a:rPr lang="it-IT" smtClean="0"/>
-              <a:t>07/03/25</a:t>
+              <a:t>10/03/25</a:t>
             </a:fld>
             <a:endParaRPr lang="it-IT"/>
           </a:p>
@@ -3449,7 +3449,7 @@
           <p:nvPr>
             <p:extLst>
               <p:ext uri="{D42A27DB-BD31-4B8C-83A1-F6EECF244321}">
-                <p14:modId xmlns:p14="http://schemas.microsoft.com/office/powerpoint/2010/main" val="813870294"/>
+                <p14:modId xmlns:p14="http://schemas.microsoft.com/office/powerpoint/2010/main" val="3611953778"/>
               </p:ext>
             </p:extLst>
           </p:nvPr>
@@ -4090,20 +4090,20 @@
                     <a:bodyPr/>
                     <a:lstStyle/>
                     <a:p>
-                      <a:r>
-                        <a:rPr lang="it-IT" sz="1200" dirty="0"/>
-                        <a:t>30*5</a:t>
-                      </a:r>
-                    </a:p>
-                  </a:txBody>
-                  <a:tcPr/>
-                </a:tc>
-                <a:tc>
-                  <a:txBody>
-                    <a:bodyPr/>
-                    <a:lstStyle/>
-                    <a:p>
-                      <a:endParaRPr lang="it-IT" sz="1200" dirty="0"/>
+                      <a:endParaRPr lang="it-IT" sz="1200" dirty="0"/>
+                    </a:p>
+                  </a:txBody>
+                  <a:tcPr/>
+                </a:tc>
+                <a:tc>
+                  <a:txBody>
+                    <a:bodyPr/>
+                    <a:lstStyle/>
+                    <a:p>
+                      <a:r>
+                        <a:rPr lang="it-IT" sz="1200" dirty="0"/>
+                        <a:t>Y</a:t>
+                      </a:r>
                     </a:p>
                   </a:txBody>
                   <a:tcPr/>
@@ -4340,20 +4340,20 @@
                     <a:bodyPr/>
                     <a:lstStyle/>
                     <a:p>
-                      <a:r>
-                        <a:rPr lang="it-IT" sz="1200" dirty="0"/>
-                        <a:t>30*5</a:t>
-                      </a:r>
-                    </a:p>
-                  </a:txBody>
-                  <a:tcPr/>
-                </a:tc>
-                <a:tc>
-                  <a:txBody>
-                    <a:bodyPr/>
-                    <a:lstStyle/>
-                    <a:p>
-                      <a:endParaRPr lang="it-IT" sz="1200" dirty="0"/>
+                      <a:endParaRPr lang="it-IT" sz="1200" dirty="0"/>
+                    </a:p>
+                  </a:txBody>
+                  <a:tcPr/>
+                </a:tc>
+                <a:tc>
+                  <a:txBody>
+                    <a:bodyPr/>
+                    <a:lstStyle/>
+                    <a:p>
+                      <a:r>
+                        <a:rPr lang="it-IT" sz="1200" dirty="0"/>
+                        <a:t>Y</a:t>
+                      </a:r>
                     </a:p>
                   </a:txBody>
                   <a:tcPr/>
@@ -4590,20 +4590,20 @@
                     <a:bodyPr/>
                     <a:lstStyle/>
                     <a:p>
-                      <a:r>
-                        <a:rPr lang="it-IT" sz="1200" dirty="0"/>
-                        <a:t>30*5</a:t>
-                      </a:r>
-                    </a:p>
-                  </a:txBody>
-                  <a:tcPr/>
-                </a:tc>
-                <a:tc>
-                  <a:txBody>
-                    <a:bodyPr/>
-                    <a:lstStyle/>
-                    <a:p>
-                      <a:endParaRPr lang="it-IT" sz="1200" dirty="0"/>
+                      <a:endParaRPr lang="it-IT" sz="1200" dirty="0"/>
+                    </a:p>
+                  </a:txBody>
+                  <a:tcPr/>
+                </a:tc>
+                <a:tc>
+                  <a:txBody>
+                    <a:bodyPr/>
+                    <a:lstStyle/>
+                    <a:p>
+                      <a:r>
+                        <a:rPr lang="it-IT" sz="1200" dirty="0"/>
+                        <a:t>Y</a:t>
+                      </a:r>
                     </a:p>
                   </a:txBody>
                   <a:tcPr/>
@@ -5962,7 +5962,7 @@
           <p:nvPr>
             <p:extLst>
               <p:ext uri="{D42A27DB-BD31-4B8C-83A1-F6EECF244321}">
-                <p14:modId xmlns:p14="http://schemas.microsoft.com/office/powerpoint/2010/main" val="1331895623"/>
+                <p14:modId xmlns:p14="http://schemas.microsoft.com/office/powerpoint/2010/main" val="18833515"/>
               </p:ext>
             </p:extLst>
           </p:nvPr>
@@ -6636,20 +6636,20 @@
                     <a:bodyPr/>
                     <a:lstStyle/>
                     <a:p>
-                      <a:r>
-                        <a:rPr lang="it-IT" sz="1200" dirty="0"/>
-                        <a:t>30*5</a:t>
-                      </a:r>
-                    </a:p>
-                  </a:txBody>
-                  <a:tcPr/>
-                </a:tc>
-                <a:tc>
-                  <a:txBody>
-                    <a:bodyPr/>
-                    <a:lstStyle/>
-                    <a:p>
-                      <a:endParaRPr lang="it-IT" sz="1200" dirty="0"/>
+                      <a:endParaRPr lang="it-IT" sz="1200" dirty="0"/>
+                    </a:p>
+                  </a:txBody>
+                  <a:tcPr/>
+                </a:tc>
+                <a:tc>
+                  <a:txBody>
+                    <a:bodyPr/>
+                    <a:lstStyle/>
+                    <a:p>
+                      <a:r>
+                        <a:rPr lang="it-IT" sz="1200" dirty="0"/>
+                        <a:t>Y</a:t>
+                      </a:r>
                     </a:p>
                   </a:txBody>
                   <a:tcPr/>
@@ -6886,20 +6886,20 @@
                     <a:bodyPr/>
                     <a:lstStyle/>
                     <a:p>
-                      <a:r>
-                        <a:rPr lang="it-IT" sz="1200" dirty="0"/>
-                        <a:t>30*5</a:t>
-                      </a:r>
-                    </a:p>
-                  </a:txBody>
-                  <a:tcPr/>
-                </a:tc>
-                <a:tc>
-                  <a:txBody>
-                    <a:bodyPr/>
-                    <a:lstStyle/>
-                    <a:p>
-                      <a:endParaRPr lang="it-IT" sz="1200" dirty="0"/>
+                      <a:endParaRPr lang="it-IT" sz="1200" dirty="0"/>
+                    </a:p>
+                  </a:txBody>
+                  <a:tcPr/>
+                </a:tc>
+                <a:tc>
+                  <a:txBody>
+                    <a:bodyPr/>
+                    <a:lstStyle/>
+                    <a:p>
+                      <a:r>
+                        <a:rPr lang="it-IT" sz="1200" dirty="0"/>
+                        <a:t>Y</a:t>
+                      </a:r>
                     </a:p>
                   </a:txBody>
                   <a:tcPr/>
@@ -7136,20 +7136,20 @@
                     <a:bodyPr/>
                     <a:lstStyle/>
                     <a:p>
-                      <a:r>
-                        <a:rPr lang="it-IT" sz="1200" dirty="0"/>
-                        <a:t>30*5</a:t>
-                      </a:r>
-                    </a:p>
-                  </a:txBody>
-                  <a:tcPr/>
-                </a:tc>
-                <a:tc>
-                  <a:txBody>
-                    <a:bodyPr/>
-                    <a:lstStyle/>
-                    <a:p>
-                      <a:endParaRPr lang="it-IT" sz="1200" dirty="0"/>
+                      <a:endParaRPr lang="it-IT" sz="1200" dirty="0"/>
+                    </a:p>
+                  </a:txBody>
+                  <a:tcPr/>
+                </a:tc>
+                <a:tc>
+                  <a:txBody>
+                    <a:bodyPr/>
+                    <a:lstStyle/>
+                    <a:p>
+                      <a:r>
+                        <a:rPr lang="it-IT" sz="1200" dirty="0"/>
+                        <a:t>Y</a:t>
+                      </a:r>
                     </a:p>
                   </a:txBody>
                   <a:tcPr/>
@@ -7655,20 +7655,20 @@
                     <a:bodyPr/>
                     <a:lstStyle/>
                     <a:p>
-                      <a:r>
-                        <a:rPr lang="it-IT" sz="1200" dirty="0"/>
-                        <a:t>30*5</a:t>
-                      </a:r>
-                    </a:p>
-                  </a:txBody>
-                  <a:tcPr/>
-                </a:tc>
-                <a:tc>
-                  <a:txBody>
-                    <a:bodyPr/>
-                    <a:lstStyle/>
-                    <a:p>
-                      <a:endParaRPr lang="it-IT" sz="1200" dirty="0"/>
+                      <a:endParaRPr lang="it-IT" sz="1200" dirty="0"/>
+                    </a:p>
+                  </a:txBody>
+                  <a:tcPr/>
+                </a:tc>
+                <a:tc>
+                  <a:txBody>
+                    <a:bodyPr/>
+                    <a:lstStyle/>
+                    <a:p>
+                      <a:r>
+                        <a:rPr lang="it-IT" sz="1200" dirty="0"/>
+                        <a:t>Y</a:t>
+                      </a:r>
                     </a:p>
                   </a:txBody>
                   <a:tcPr/>
@@ -7905,20 +7905,20 @@
                     <a:bodyPr/>
                     <a:lstStyle/>
                     <a:p>
-                      <a:r>
-                        <a:rPr lang="it-IT" sz="1200" dirty="0"/>
-                        <a:t>30*5</a:t>
-                      </a:r>
-                    </a:p>
-                  </a:txBody>
-                  <a:tcPr/>
-                </a:tc>
-                <a:tc>
-                  <a:txBody>
-                    <a:bodyPr/>
-                    <a:lstStyle/>
-                    <a:p>
-                      <a:endParaRPr lang="it-IT" sz="1200" dirty="0"/>
+                      <a:endParaRPr lang="it-IT" sz="1200" dirty="0"/>
+                    </a:p>
+                  </a:txBody>
+                  <a:tcPr/>
+                </a:tc>
+                <a:tc>
+                  <a:txBody>
+                    <a:bodyPr/>
+                    <a:lstStyle/>
+                    <a:p>
+                      <a:r>
+                        <a:rPr lang="it-IT" sz="1200" dirty="0"/>
+                        <a:t>Y</a:t>
+                      </a:r>
                     </a:p>
                   </a:txBody>
                   <a:tcPr/>
@@ -8155,20 +8155,20 @@
                     <a:bodyPr/>
                     <a:lstStyle/>
                     <a:p>
-                      <a:r>
-                        <a:rPr lang="it-IT" sz="1200" dirty="0"/>
-                        <a:t>30*5</a:t>
-                      </a:r>
-                    </a:p>
-                  </a:txBody>
-                  <a:tcPr/>
-                </a:tc>
-                <a:tc>
-                  <a:txBody>
-                    <a:bodyPr/>
-                    <a:lstStyle/>
-                    <a:p>
-                      <a:endParaRPr lang="it-IT" sz="1200" dirty="0"/>
+                      <a:endParaRPr lang="it-IT" sz="1200" dirty="0"/>
+                    </a:p>
+                  </a:txBody>
+                  <a:tcPr/>
+                </a:tc>
+                <a:tc>
+                  <a:txBody>
+                    <a:bodyPr/>
+                    <a:lstStyle/>
+                    <a:p>
+                      <a:r>
+                        <a:rPr lang="it-IT" sz="1200" dirty="0"/>
+                        <a:t>Y</a:t>
+                      </a:r>
                     </a:p>
                   </a:txBody>
                   <a:tcPr/>
@@ -8524,7 +8524,7 @@
           <p:nvPr>
             <p:extLst>
               <p:ext uri="{D42A27DB-BD31-4B8C-83A1-F6EECF244321}">
-                <p14:modId xmlns:p14="http://schemas.microsoft.com/office/powerpoint/2010/main" val="3889456345"/>
+                <p14:modId xmlns:p14="http://schemas.microsoft.com/office/powerpoint/2010/main" val="3992493208"/>
               </p:ext>
             </p:extLst>
           </p:nvPr>
@@ -9198,20 +9198,20 @@
                     <a:bodyPr/>
                     <a:lstStyle/>
                     <a:p>
-                      <a:r>
-                        <a:rPr lang="it-IT" sz="1200" dirty="0"/>
-                        <a:t>30*5</a:t>
-                      </a:r>
-                    </a:p>
-                  </a:txBody>
-                  <a:tcPr/>
-                </a:tc>
-                <a:tc>
-                  <a:txBody>
-                    <a:bodyPr/>
-                    <a:lstStyle/>
-                    <a:p>
-                      <a:endParaRPr lang="it-IT" sz="1200" dirty="0"/>
+                      <a:endParaRPr lang="it-IT" sz="1200" dirty="0"/>
+                    </a:p>
+                  </a:txBody>
+                  <a:tcPr/>
+                </a:tc>
+                <a:tc>
+                  <a:txBody>
+                    <a:bodyPr/>
+                    <a:lstStyle/>
+                    <a:p>
+                      <a:r>
+                        <a:rPr lang="it-IT" sz="1200" dirty="0"/>
+                        <a:t>Y</a:t>
+                      </a:r>
                     </a:p>
                   </a:txBody>
                   <a:tcPr/>
@@ -9448,20 +9448,20 @@
                     <a:bodyPr/>
                     <a:lstStyle/>
                     <a:p>
-                      <a:r>
-                        <a:rPr lang="it-IT" sz="1200" dirty="0"/>
-                        <a:t>30*5</a:t>
-                      </a:r>
-                    </a:p>
-                  </a:txBody>
-                  <a:tcPr/>
-                </a:tc>
-                <a:tc>
-                  <a:txBody>
-                    <a:bodyPr/>
-                    <a:lstStyle/>
-                    <a:p>
-                      <a:endParaRPr lang="it-IT" sz="1200" dirty="0"/>
+                      <a:endParaRPr lang="it-IT" sz="1200" dirty="0"/>
+                    </a:p>
+                  </a:txBody>
+                  <a:tcPr/>
+                </a:tc>
+                <a:tc>
+                  <a:txBody>
+                    <a:bodyPr/>
+                    <a:lstStyle/>
+                    <a:p>
+                      <a:r>
+                        <a:rPr lang="it-IT" sz="1200" dirty="0"/>
+                        <a:t>Y</a:t>
+                      </a:r>
                     </a:p>
                   </a:txBody>
                   <a:tcPr/>
@@ -9698,20 +9698,20 @@
                     <a:bodyPr/>
                     <a:lstStyle/>
                     <a:p>
-                      <a:r>
-                        <a:rPr lang="it-IT" sz="1200" dirty="0"/>
-                        <a:t>30*5</a:t>
-                      </a:r>
-                    </a:p>
-                  </a:txBody>
-                  <a:tcPr/>
-                </a:tc>
-                <a:tc>
-                  <a:txBody>
-                    <a:bodyPr/>
-                    <a:lstStyle/>
-                    <a:p>
-                      <a:endParaRPr lang="it-IT" sz="1200" dirty="0"/>
+                      <a:endParaRPr lang="it-IT" sz="1200" dirty="0"/>
+                    </a:p>
+                  </a:txBody>
+                  <a:tcPr/>
+                </a:tc>
+                <a:tc>
+                  <a:txBody>
+                    <a:bodyPr/>
+                    <a:lstStyle/>
+                    <a:p>
+                      <a:r>
+                        <a:rPr lang="it-IT" sz="1200" dirty="0"/>
+                        <a:t>Y</a:t>
+                      </a:r>
                     </a:p>
                   </a:txBody>
                   <a:tcPr/>
@@ -10073,8 +10073,12 @@
                     <a:lstStyle/>
                     <a:p>
                       <a:r>
-                        <a:rPr lang="it-IT" sz="1200" dirty="0"/>
-                        <a:t>~4 days</a:t>
+                        <a:rPr lang="it-IT" sz="1200"/>
+                        <a:t>~ 3 </a:t>
+                      </a:r>
+                      <a:r>
+                        <a:rPr lang="it-IT" sz="1200" dirty="0"/>
+                        <a:t>days</a:t>
                       </a:r>
                     </a:p>
                   </a:txBody>

</xml_diff>

<commit_message>
adding second batch of results
</commit_message>
<xml_diff>
--- a/extra_material/exp_plan.pptx
+++ b/extra_material/exp_plan.pptx
@@ -262,7 +262,7 @@
           <a:p>
             <a:fld id="{D9DFC112-CD81-6544-BC9B-69B280E44EE3}" type="datetimeFigureOut">
               <a:rPr lang="it-IT" smtClean="0"/>
-              <a:t>10/03/25</a:t>
+              <a:t>12/03/25</a:t>
             </a:fld>
             <a:endParaRPr lang="it-IT"/>
           </a:p>
@@ -460,7 +460,7 @@
           <a:p>
             <a:fld id="{D9DFC112-CD81-6544-BC9B-69B280E44EE3}" type="datetimeFigureOut">
               <a:rPr lang="it-IT" smtClean="0"/>
-              <a:t>10/03/25</a:t>
+              <a:t>12/03/25</a:t>
             </a:fld>
             <a:endParaRPr lang="it-IT"/>
           </a:p>
@@ -668,7 +668,7 @@
           <a:p>
             <a:fld id="{D9DFC112-CD81-6544-BC9B-69B280E44EE3}" type="datetimeFigureOut">
               <a:rPr lang="it-IT" smtClean="0"/>
-              <a:t>10/03/25</a:t>
+              <a:t>12/03/25</a:t>
             </a:fld>
             <a:endParaRPr lang="it-IT"/>
           </a:p>
@@ -866,7 +866,7 @@
           <a:p>
             <a:fld id="{D9DFC112-CD81-6544-BC9B-69B280E44EE3}" type="datetimeFigureOut">
               <a:rPr lang="it-IT" smtClean="0"/>
-              <a:t>10/03/25</a:t>
+              <a:t>12/03/25</a:t>
             </a:fld>
             <a:endParaRPr lang="it-IT"/>
           </a:p>
@@ -1141,7 +1141,7 @@
           <a:p>
             <a:fld id="{D9DFC112-CD81-6544-BC9B-69B280E44EE3}" type="datetimeFigureOut">
               <a:rPr lang="it-IT" smtClean="0"/>
-              <a:t>10/03/25</a:t>
+              <a:t>12/03/25</a:t>
             </a:fld>
             <a:endParaRPr lang="it-IT"/>
           </a:p>
@@ -1406,7 +1406,7 @@
           <a:p>
             <a:fld id="{D9DFC112-CD81-6544-BC9B-69B280E44EE3}" type="datetimeFigureOut">
               <a:rPr lang="it-IT" smtClean="0"/>
-              <a:t>10/03/25</a:t>
+              <a:t>12/03/25</a:t>
             </a:fld>
             <a:endParaRPr lang="it-IT"/>
           </a:p>
@@ -1818,7 +1818,7 @@
           <a:p>
             <a:fld id="{D9DFC112-CD81-6544-BC9B-69B280E44EE3}" type="datetimeFigureOut">
               <a:rPr lang="it-IT" smtClean="0"/>
-              <a:t>10/03/25</a:t>
+              <a:t>12/03/25</a:t>
             </a:fld>
             <a:endParaRPr lang="it-IT"/>
           </a:p>
@@ -1959,7 +1959,7 @@
           <a:p>
             <a:fld id="{D9DFC112-CD81-6544-BC9B-69B280E44EE3}" type="datetimeFigureOut">
               <a:rPr lang="it-IT" smtClean="0"/>
-              <a:t>10/03/25</a:t>
+              <a:t>12/03/25</a:t>
             </a:fld>
             <a:endParaRPr lang="it-IT"/>
           </a:p>
@@ -2072,7 +2072,7 @@
           <a:p>
             <a:fld id="{D9DFC112-CD81-6544-BC9B-69B280E44EE3}" type="datetimeFigureOut">
               <a:rPr lang="it-IT" smtClean="0"/>
-              <a:t>10/03/25</a:t>
+              <a:t>12/03/25</a:t>
             </a:fld>
             <a:endParaRPr lang="it-IT"/>
           </a:p>
@@ -2383,7 +2383,7 @@
           <a:p>
             <a:fld id="{D9DFC112-CD81-6544-BC9B-69B280E44EE3}" type="datetimeFigureOut">
               <a:rPr lang="it-IT" smtClean="0"/>
-              <a:t>10/03/25</a:t>
+              <a:t>12/03/25</a:t>
             </a:fld>
             <a:endParaRPr lang="it-IT"/>
           </a:p>
@@ -2671,7 +2671,7 @@
           <a:p>
             <a:fld id="{D9DFC112-CD81-6544-BC9B-69B280E44EE3}" type="datetimeFigureOut">
               <a:rPr lang="it-IT" smtClean="0"/>
-              <a:t>10/03/25</a:t>
+              <a:t>12/03/25</a:t>
             </a:fld>
             <a:endParaRPr lang="it-IT"/>
           </a:p>
@@ -2912,7 +2912,7 @@
           <a:p>
             <a:fld id="{D9DFC112-CD81-6544-BC9B-69B280E44EE3}" type="datetimeFigureOut">
               <a:rPr lang="it-IT" smtClean="0"/>
-              <a:t>10/03/25</a:t>
+              <a:t>12/03/25</a:t>
             </a:fld>
             <a:endParaRPr lang="it-IT"/>
           </a:p>
@@ -3449,7 +3449,7 @@
           <p:nvPr>
             <p:extLst>
               <p:ext uri="{D42A27DB-BD31-4B8C-83A1-F6EECF244321}">
-                <p14:modId xmlns:p14="http://schemas.microsoft.com/office/powerpoint/2010/main" val="3611953778"/>
+                <p14:modId xmlns:p14="http://schemas.microsoft.com/office/powerpoint/2010/main" val="3330784290"/>
               </p:ext>
             </p:extLst>
           </p:nvPr>
@@ -3967,20 +3967,20 @@
                     <a:bodyPr/>
                     <a:lstStyle/>
                     <a:p>
-                      <a:r>
-                        <a:rPr lang="it-IT" sz="1200" dirty="0"/>
-                        <a:t>30*5</a:t>
-                      </a:r>
-                    </a:p>
-                  </a:txBody>
-                  <a:tcPr/>
-                </a:tc>
-                <a:tc>
-                  <a:txBody>
-                    <a:bodyPr/>
-                    <a:lstStyle/>
-                    <a:p>
-                      <a:endParaRPr lang="it-IT" sz="1200" dirty="0"/>
+                      <a:endParaRPr lang="it-IT" sz="1200" dirty="0"/>
+                    </a:p>
+                  </a:txBody>
+                  <a:tcPr/>
+                </a:tc>
+                <a:tc>
+                  <a:txBody>
+                    <a:bodyPr/>
+                    <a:lstStyle/>
+                    <a:p>
+                      <a:r>
+                        <a:rPr lang="it-IT" sz="1200" dirty="0"/>
+                        <a:t>Y</a:t>
+                      </a:r>
                     </a:p>
                   </a:txBody>
                   <a:tcPr/>
@@ -4217,20 +4217,20 @@
                     <a:bodyPr/>
                     <a:lstStyle/>
                     <a:p>
-                      <a:r>
-                        <a:rPr lang="it-IT" sz="1200" dirty="0"/>
-                        <a:t>30*5</a:t>
-                      </a:r>
-                    </a:p>
-                  </a:txBody>
-                  <a:tcPr/>
-                </a:tc>
-                <a:tc>
-                  <a:txBody>
-                    <a:bodyPr/>
-                    <a:lstStyle/>
-                    <a:p>
-                      <a:endParaRPr lang="it-IT" sz="1200" dirty="0"/>
+                      <a:endParaRPr lang="it-IT" sz="1200" dirty="0"/>
+                    </a:p>
+                  </a:txBody>
+                  <a:tcPr/>
+                </a:tc>
+                <a:tc>
+                  <a:txBody>
+                    <a:bodyPr/>
+                    <a:lstStyle/>
+                    <a:p>
+                      <a:r>
+                        <a:rPr lang="it-IT" sz="1200" dirty="0"/>
+                        <a:t>Y</a:t>
+                      </a:r>
                     </a:p>
                   </a:txBody>
                   <a:tcPr/>
@@ -4467,20 +4467,20 @@
                     <a:bodyPr/>
                     <a:lstStyle/>
                     <a:p>
-                      <a:r>
-                        <a:rPr lang="it-IT" sz="1200" dirty="0"/>
-                        <a:t>30*5</a:t>
-                      </a:r>
-                    </a:p>
-                  </a:txBody>
-                  <a:tcPr/>
-                </a:tc>
-                <a:tc>
-                  <a:txBody>
-                    <a:bodyPr/>
-                    <a:lstStyle/>
-                    <a:p>
-                      <a:endParaRPr lang="it-IT" sz="1200" dirty="0"/>
+                      <a:endParaRPr lang="it-IT" sz="1200" dirty="0"/>
+                    </a:p>
+                  </a:txBody>
+                  <a:tcPr/>
+                </a:tc>
+                <a:tc>
+                  <a:txBody>
+                    <a:bodyPr/>
+                    <a:lstStyle/>
+                    <a:p>
+                      <a:r>
+                        <a:rPr lang="it-IT" sz="1200" dirty="0"/>
+                        <a:t>Y</a:t>
+                      </a:r>
                     </a:p>
                   </a:txBody>
                   <a:tcPr/>
@@ -5962,7 +5962,7 @@
           <p:nvPr>
             <p:extLst>
               <p:ext uri="{D42A27DB-BD31-4B8C-83A1-F6EECF244321}">
-                <p14:modId xmlns:p14="http://schemas.microsoft.com/office/powerpoint/2010/main" val="18833515"/>
+                <p14:modId xmlns:p14="http://schemas.microsoft.com/office/powerpoint/2010/main" val="3911989121"/>
               </p:ext>
             </p:extLst>
           </p:nvPr>
@@ -6513,20 +6513,20 @@
                     <a:bodyPr/>
                     <a:lstStyle/>
                     <a:p>
-                      <a:r>
-                        <a:rPr lang="it-IT" sz="1200" dirty="0"/>
-                        <a:t>30*5</a:t>
-                      </a:r>
-                    </a:p>
-                  </a:txBody>
-                  <a:tcPr/>
-                </a:tc>
-                <a:tc>
-                  <a:txBody>
-                    <a:bodyPr/>
-                    <a:lstStyle/>
-                    <a:p>
-                      <a:endParaRPr lang="it-IT" sz="1200" dirty="0"/>
+                      <a:endParaRPr lang="it-IT" sz="1200" dirty="0"/>
+                    </a:p>
+                  </a:txBody>
+                  <a:tcPr/>
+                </a:tc>
+                <a:tc>
+                  <a:txBody>
+                    <a:bodyPr/>
+                    <a:lstStyle/>
+                    <a:p>
+                      <a:r>
+                        <a:rPr lang="it-IT" sz="1200" dirty="0"/>
+                        <a:t>Y</a:t>
+                      </a:r>
                     </a:p>
                   </a:txBody>
                   <a:tcPr/>
@@ -6763,20 +6763,20 @@
                     <a:bodyPr/>
                     <a:lstStyle/>
                     <a:p>
-                      <a:r>
-                        <a:rPr lang="it-IT" sz="1200" dirty="0"/>
-                        <a:t>30*5</a:t>
-                      </a:r>
-                    </a:p>
-                  </a:txBody>
-                  <a:tcPr/>
-                </a:tc>
-                <a:tc>
-                  <a:txBody>
-                    <a:bodyPr/>
-                    <a:lstStyle/>
-                    <a:p>
-                      <a:endParaRPr lang="it-IT" sz="1200" dirty="0"/>
+                      <a:endParaRPr lang="it-IT" sz="1200" dirty="0"/>
+                    </a:p>
+                  </a:txBody>
+                  <a:tcPr/>
+                </a:tc>
+                <a:tc>
+                  <a:txBody>
+                    <a:bodyPr/>
+                    <a:lstStyle/>
+                    <a:p>
+                      <a:r>
+                        <a:rPr lang="it-IT" sz="1200" dirty="0"/>
+                        <a:t>Y</a:t>
+                      </a:r>
                     </a:p>
                   </a:txBody>
                   <a:tcPr/>
@@ -7013,20 +7013,20 @@
                     <a:bodyPr/>
                     <a:lstStyle/>
                     <a:p>
-                      <a:r>
-                        <a:rPr lang="it-IT" sz="1200" dirty="0"/>
-                        <a:t>30*5</a:t>
-                      </a:r>
-                    </a:p>
-                  </a:txBody>
-                  <a:tcPr/>
-                </a:tc>
-                <a:tc>
-                  <a:txBody>
-                    <a:bodyPr/>
-                    <a:lstStyle/>
-                    <a:p>
-                      <a:endParaRPr lang="it-IT" sz="1200" dirty="0"/>
+                      <a:endParaRPr lang="it-IT" sz="1200" dirty="0"/>
+                    </a:p>
+                  </a:txBody>
+                  <a:tcPr/>
+                </a:tc>
+                <a:tc>
+                  <a:txBody>
+                    <a:bodyPr/>
+                    <a:lstStyle/>
+                    <a:p>
+                      <a:r>
+                        <a:rPr lang="it-IT" sz="1200" dirty="0"/>
+                        <a:t>Y</a:t>
+                      </a:r>
                     </a:p>
                   </a:txBody>
                   <a:tcPr/>
@@ -7532,20 +7532,20 @@
                     <a:bodyPr/>
                     <a:lstStyle/>
                     <a:p>
-                      <a:r>
-                        <a:rPr lang="it-IT" sz="1200" dirty="0"/>
-                        <a:t>30*5</a:t>
-                      </a:r>
-                    </a:p>
-                  </a:txBody>
-                  <a:tcPr/>
-                </a:tc>
-                <a:tc>
-                  <a:txBody>
-                    <a:bodyPr/>
-                    <a:lstStyle/>
-                    <a:p>
-                      <a:endParaRPr lang="it-IT" sz="1200" dirty="0"/>
+                      <a:endParaRPr lang="it-IT" sz="1200" dirty="0"/>
+                    </a:p>
+                  </a:txBody>
+                  <a:tcPr/>
+                </a:tc>
+                <a:tc>
+                  <a:txBody>
+                    <a:bodyPr/>
+                    <a:lstStyle/>
+                    <a:p>
+                      <a:r>
+                        <a:rPr lang="it-IT" sz="1200" dirty="0"/>
+                        <a:t>Y</a:t>
+                      </a:r>
                     </a:p>
                   </a:txBody>
                   <a:tcPr/>
@@ -7782,20 +7782,20 @@
                     <a:bodyPr/>
                     <a:lstStyle/>
                     <a:p>
-                      <a:r>
-                        <a:rPr lang="it-IT" sz="1200" dirty="0"/>
-                        <a:t>30*5</a:t>
-                      </a:r>
-                    </a:p>
-                  </a:txBody>
-                  <a:tcPr/>
-                </a:tc>
-                <a:tc>
-                  <a:txBody>
-                    <a:bodyPr/>
-                    <a:lstStyle/>
-                    <a:p>
-                      <a:endParaRPr lang="it-IT" sz="1200" dirty="0"/>
+                      <a:endParaRPr lang="it-IT" sz="1200" dirty="0"/>
+                    </a:p>
+                  </a:txBody>
+                  <a:tcPr/>
+                </a:tc>
+                <a:tc>
+                  <a:txBody>
+                    <a:bodyPr/>
+                    <a:lstStyle/>
+                    <a:p>
+                      <a:r>
+                        <a:rPr lang="it-IT" sz="1200" dirty="0"/>
+                        <a:t>Y</a:t>
+                      </a:r>
                     </a:p>
                   </a:txBody>
                   <a:tcPr/>
@@ -8032,20 +8032,20 @@
                     <a:bodyPr/>
                     <a:lstStyle/>
                     <a:p>
-                      <a:r>
-                        <a:rPr lang="it-IT" sz="1200" dirty="0"/>
-                        <a:t>30*5</a:t>
-                      </a:r>
-                    </a:p>
-                  </a:txBody>
-                  <a:tcPr/>
-                </a:tc>
-                <a:tc>
-                  <a:txBody>
-                    <a:bodyPr/>
-                    <a:lstStyle/>
-                    <a:p>
-                      <a:endParaRPr lang="it-IT" sz="1200" dirty="0"/>
+                      <a:endParaRPr lang="it-IT" sz="1200" dirty="0"/>
+                    </a:p>
+                  </a:txBody>
+                  <a:tcPr/>
+                </a:tc>
+                <a:tc>
+                  <a:txBody>
+                    <a:bodyPr/>
+                    <a:lstStyle/>
+                    <a:p>
+                      <a:r>
+                        <a:rPr lang="it-IT" sz="1200" dirty="0"/>
+                        <a:t>Y</a:t>
+                      </a:r>
                     </a:p>
                   </a:txBody>
                   <a:tcPr/>
@@ -8524,7 +8524,7 @@
           <p:nvPr>
             <p:extLst>
               <p:ext uri="{D42A27DB-BD31-4B8C-83A1-F6EECF244321}">
-                <p14:modId xmlns:p14="http://schemas.microsoft.com/office/powerpoint/2010/main" val="3992493208"/>
+                <p14:modId xmlns:p14="http://schemas.microsoft.com/office/powerpoint/2010/main" val="1068091212"/>
               </p:ext>
             </p:extLst>
           </p:nvPr>
@@ -9075,20 +9075,20 @@
                     <a:bodyPr/>
                     <a:lstStyle/>
                     <a:p>
-                      <a:r>
-                        <a:rPr lang="it-IT" sz="1200" dirty="0"/>
-                        <a:t>30*5</a:t>
-                      </a:r>
-                    </a:p>
-                  </a:txBody>
-                  <a:tcPr/>
-                </a:tc>
-                <a:tc>
-                  <a:txBody>
-                    <a:bodyPr/>
-                    <a:lstStyle/>
-                    <a:p>
-                      <a:endParaRPr lang="it-IT" sz="1200" dirty="0"/>
+                      <a:endParaRPr lang="it-IT" sz="1200" dirty="0"/>
+                    </a:p>
+                  </a:txBody>
+                  <a:tcPr/>
+                </a:tc>
+                <a:tc>
+                  <a:txBody>
+                    <a:bodyPr/>
+                    <a:lstStyle/>
+                    <a:p>
+                      <a:r>
+                        <a:rPr lang="it-IT" sz="1200" dirty="0"/>
+                        <a:t>Y</a:t>
+                      </a:r>
                     </a:p>
                   </a:txBody>
                   <a:tcPr/>
@@ -9325,20 +9325,20 @@
                     <a:bodyPr/>
                     <a:lstStyle/>
                     <a:p>
-                      <a:r>
-                        <a:rPr lang="it-IT" sz="1200" dirty="0"/>
-                        <a:t>30*5</a:t>
-                      </a:r>
-                    </a:p>
-                  </a:txBody>
-                  <a:tcPr/>
-                </a:tc>
-                <a:tc>
-                  <a:txBody>
-                    <a:bodyPr/>
-                    <a:lstStyle/>
-                    <a:p>
-                      <a:endParaRPr lang="it-IT" sz="1200" dirty="0"/>
+                      <a:endParaRPr lang="it-IT" sz="1200" dirty="0"/>
+                    </a:p>
+                  </a:txBody>
+                  <a:tcPr/>
+                </a:tc>
+                <a:tc>
+                  <a:txBody>
+                    <a:bodyPr/>
+                    <a:lstStyle/>
+                    <a:p>
+                      <a:r>
+                        <a:rPr lang="it-IT" sz="1200" dirty="0"/>
+                        <a:t>Y</a:t>
+                      </a:r>
                     </a:p>
                   </a:txBody>
                   <a:tcPr/>
@@ -9575,20 +9575,20 @@
                     <a:bodyPr/>
                     <a:lstStyle/>
                     <a:p>
-                      <a:r>
-                        <a:rPr lang="it-IT" sz="1200" dirty="0"/>
-                        <a:t>30*5</a:t>
-                      </a:r>
-                    </a:p>
-                  </a:txBody>
-                  <a:tcPr/>
-                </a:tc>
-                <a:tc>
-                  <a:txBody>
-                    <a:bodyPr/>
-                    <a:lstStyle/>
-                    <a:p>
-                      <a:endParaRPr lang="it-IT" sz="1200" dirty="0"/>
+                      <a:endParaRPr lang="it-IT" sz="1200" dirty="0"/>
+                    </a:p>
+                  </a:txBody>
+                  <a:tcPr/>
+                </a:tc>
+                <a:tc>
+                  <a:txBody>
+                    <a:bodyPr/>
+                    <a:lstStyle/>
+                    <a:p>
+                      <a:r>
+                        <a:rPr lang="it-IT" sz="1200" dirty="0"/>
+                        <a:t>Y</a:t>
+                      </a:r>
                     </a:p>
                   </a:txBody>
                   <a:tcPr/>
@@ -10074,7 +10074,7 @@
                     <a:p>
                       <a:r>
                         <a:rPr lang="it-IT" sz="1200"/>
-                        <a:t>~ 3 </a:t>
+                        <a:t>~ 1.5 </a:t>
                       </a:r>
                       <a:r>
                         <a:rPr lang="it-IT" sz="1200" dirty="0"/>

</xml_diff>

<commit_message>
adding new batch of results
</commit_message>
<xml_diff>
--- a/extra_material/exp_plan.pptx
+++ b/extra_material/exp_plan.pptx
@@ -262,7 +262,7 @@
           <a:p>
             <a:fld id="{D9DFC112-CD81-6544-BC9B-69B280E44EE3}" type="datetimeFigureOut">
               <a:rPr lang="it-IT" smtClean="0"/>
-              <a:t>12/03/25</a:t>
+              <a:t>25/03/25</a:t>
             </a:fld>
             <a:endParaRPr lang="it-IT"/>
           </a:p>
@@ -460,7 +460,7 @@
           <a:p>
             <a:fld id="{D9DFC112-CD81-6544-BC9B-69B280E44EE3}" type="datetimeFigureOut">
               <a:rPr lang="it-IT" smtClean="0"/>
-              <a:t>12/03/25</a:t>
+              <a:t>25/03/25</a:t>
             </a:fld>
             <a:endParaRPr lang="it-IT"/>
           </a:p>
@@ -668,7 +668,7 @@
           <a:p>
             <a:fld id="{D9DFC112-CD81-6544-BC9B-69B280E44EE3}" type="datetimeFigureOut">
               <a:rPr lang="it-IT" smtClean="0"/>
-              <a:t>12/03/25</a:t>
+              <a:t>25/03/25</a:t>
             </a:fld>
             <a:endParaRPr lang="it-IT"/>
           </a:p>
@@ -866,7 +866,7 @@
           <a:p>
             <a:fld id="{D9DFC112-CD81-6544-BC9B-69B280E44EE3}" type="datetimeFigureOut">
               <a:rPr lang="it-IT" smtClean="0"/>
-              <a:t>12/03/25</a:t>
+              <a:t>25/03/25</a:t>
             </a:fld>
             <a:endParaRPr lang="it-IT"/>
           </a:p>
@@ -1141,7 +1141,7 @@
           <a:p>
             <a:fld id="{D9DFC112-CD81-6544-BC9B-69B280E44EE3}" type="datetimeFigureOut">
               <a:rPr lang="it-IT" smtClean="0"/>
-              <a:t>12/03/25</a:t>
+              <a:t>25/03/25</a:t>
             </a:fld>
             <a:endParaRPr lang="it-IT"/>
           </a:p>
@@ -1406,7 +1406,7 @@
           <a:p>
             <a:fld id="{D9DFC112-CD81-6544-BC9B-69B280E44EE3}" type="datetimeFigureOut">
               <a:rPr lang="it-IT" smtClean="0"/>
-              <a:t>12/03/25</a:t>
+              <a:t>25/03/25</a:t>
             </a:fld>
             <a:endParaRPr lang="it-IT"/>
           </a:p>
@@ -1818,7 +1818,7 @@
           <a:p>
             <a:fld id="{D9DFC112-CD81-6544-BC9B-69B280E44EE3}" type="datetimeFigureOut">
               <a:rPr lang="it-IT" smtClean="0"/>
-              <a:t>12/03/25</a:t>
+              <a:t>25/03/25</a:t>
             </a:fld>
             <a:endParaRPr lang="it-IT"/>
           </a:p>
@@ -1959,7 +1959,7 @@
           <a:p>
             <a:fld id="{D9DFC112-CD81-6544-BC9B-69B280E44EE3}" type="datetimeFigureOut">
               <a:rPr lang="it-IT" smtClean="0"/>
-              <a:t>12/03/25</a:t>
+              <a:t>25/03/25</a:t>
             </a:fld>
             <a:endParaRPr lang="it-IT"/>
           </a:p>
@@ -2072,7 +2072,7 @@
           <a:p>
             <a:fld id="{D9DFC112-CD81-6544-BC9B-69B280E44EE3}" type="datetimeFigureOut">
               <a:rPr lang="it-IT" smtClean="0"/>
-              <a:t>12/03/25</a:t>
+              <a:t>25/03/25</a:t>
             </a:fld>
             <a:endParaRPr lang="it-IT"/>
           </a:p>
@@ -2383,7 +2383,7 @@
           <a:p>
             <a:fld id="{D9DFC112-CD81-6544-BC9B-69B280E44EE3}" type="datetimeFigureOut">
               <a:rPr lang="it-IT" smtClean="0"/>
-              <a:t>12/03/25</a:t>
+              <a:t>25/03/25</a:t>
             </a:fld>
             <a:endParaRPr lang="it-IT"/>
           </a:p>
@@ -2671,7 +2671,7 @@
           <a:p>
             <a:fld id="{D9DFC112-CD81-6544-BC9B-69B280E44EE3}" type="datetimeFigureOut">
               <a:rPr lang="it-IT" smtClean="0"/>
-              <a:t>12/03/25</a:t>
+              <a:t>25/03/25</a:t>
             </a:fld>
             <a:endParaRPr lang="it-IT"/>
           </a:p>
@@ -2912,7 +2912,7 @@
           <a:p>
             <a:fld id="{D9DFC112-CD81-6544-BC9B-69B280E44EE3}" type="datetimeFigureOut">
               <a:rPr lang="it-IT" smtClean="0"/>
-              <a:t>12/03/25</a:t>
+              <a:t>25/03/25</a:t>
             </a:fld>
             <a:endParaRPr lang="it-IT"/>
           </a:p>
@@ -3449,7 +3449,7 @@
           <p:nvPr>
             <p:extLst>
               <p:ext uri="{D42A27DB-BD31-4B8C-83A1-F6EECF244321}">
-                <p14:modId xmlns:p14="http://schemas.microsoft.com/office/powerpoint/2010/main" val="3330784290"/>
+                <p14:modId xmlns:p14="http://schemas.microsoft.com/office/powerpoint/2010/main" val="3890635759"/>
               </p:ext>
             </p:extLst>
           </p:nvPr>
@@ -4717,20 +4717,20 @@
                     <a:bodyPr/>
                     <a:lstStyle/>
                     <a:p>
-                      <a:r>
-                        <a:rPr lang="it-IT" sz="1200" dirty="0"/>
-                        <a:t>30*5</a:t>
-                      </a:r>
-                    </a:p>
-                  </a:txBody>
-                  <a:tcPr/>
-                </a:tc>
-                <a:tc>
-                  <a:txBody>
-                    <a:bodyPr/>
-                    <a:lstStyle/>
-                    <a:p>
-                      <a:endParaRPr lang="it-IT" sz="1200" dirty="0"/>
+                      <a:endParaRPr lang="it-IT" sz="1200" dirty="0"/>
+                    </a:p>
+                  </a:txBody>
+                  <a:tcPr/>
+                </a:tc>
+                <a:tc>
+                  <a:txBody>
+                    <a:bodyPr/>
+                    <a:lstStyle/>
+                    <a:p>
+                      <a:r>
+                        <a:rPr lang="it-IT" sz="1200" dirty="0"/>
+                        <a:t>Y</a:t>
+                      </a:r>
                     </a:p>
                   </a:txBody>
                   <a:tcPr/>
@@ -4840,20 +4840,20 @@
                     <a:bodyPr/>
                     <a:lstStyle/>
                     <a:p>
-                      <a:r>
-                        <a:rPr lang="it-IT" sz="1200" dirty="0"/>
-                        <a:t>30*5</a:t>
-                      </a:r>
-                    </a:p>
-                  </a:txBody>
-                  <a:tcPr/>
-                </a:tc>
-                <a:tc>
-                  <a:txBody>
-                    <a:bodyPr/>
-                    <a:lstStyle/>
-                    <a:p>
-                      <a:endParaRPr lang="it-IT" sz="1200" dirty="0"/>
+                      <a:endParaRPr lang="it-IT" sz="1200" dirty="0"/>
+                    </a:p>
+                  </a:txBody>
+                  <a:tcPr/>
+                </a:tc>
+                <a:tc>
+                  <a:txBody>
+                    <a:bodyPr/>
+                    <a:lstStyle/>
+                    <a:p>
+                      <a:r>
+                        <a:rPr lang="it-IT" sz="1200" dirty="0"/>
+                        <a:t>Y</a:t>
+                      </a:r>
                     </a:p>
                   </a:txBody>
                   <a:tcPr/>
@@ -5962,7 +5962,7 @@
           <p:nvPr>
             <p:extLst>
               <p:ext uri="{D42A27DB-BD31-4B8C-83A1-F6EECF244321}">
-                <p14:modId xmlns:p14="http://schemas.microsoft.com/office/powerpoint/2010/main" val="3911989121"/>
+                <p14:modId xmlns:p14="http://schemas.microsoft.com/office/powerpoint/2010/main" val="240477343"/>
               </p:ext>
             </p:extLst>
           </p:nvPr>
@@ -7263,20 +7263,20 @@
                     <a:bodyPr/>
                     <a:lstStyle/>
                     <a:p>
-                      <a:r>
-                        <a:rPr lang="it-IT" sz="1200" dirty="0"/>
-                        <a:t>30*5</a:t>
-                      </a:r>
-                    </a:p>
-                  </a:txBody>
-                  <a:tcPr/>
-                </a:tc>
-                <a:tc>
-                  <a:txBody>
-                    <a:bodyPr/>
-                    <a:lstStyle/>
-                    <a:p>
-                      <a:endParaRPr lang="it-IT" sz="1200" dirty="0"/>
+                      <a:endParaRPr lang="it-IT" sz="1200" dirty="0"/>
+                    </a:p>
+                  </a:txBody>
+                  <a:tcPr/>
+                </a:tc>
+                <a:tc>
+                  <a:txBody>
+                    <a:bodyPr/>
+                    <a:lstStyle/>
+                    <a:p>
+                      <a:r>
+                        <a:rPr lang="it-IT" sz="1200" dirty="0"/>
+                        <a:t>Y</a:t>
+                      </a:r>
                     </a:p>
                   </a:txBody>
                   <a:tcPr/>
@@ -7386,20 +7386,20 @@
                     <a:bodyPr/>
                     <a:lstStyle/>
                     <a:p>
-                      <a:r>
-                        <a:rPr lang="it-IT" sz="1200" dirty="0"/>
-                        <a:t>30*5</a:t>
-                      </a:r>
-                    </a:p>
-                  </a:txBody>
-                  <a:tcPr/>
-                </a:tc>
-                <a:tc>
-                  <a:txBody>
-                    <a:bodyPr/>
-                    <a:lstStyle/>
-                    <a:p>
-                      <a:endParaRPr lang="it-IT" sz="1200" dirty="0"/>
+                      <a:endParaRPr lang="it-IT" sz="1200" dirty="0"/>
+                    </a:p>
+                  </a:txBody>
+                  <a:tcPr/>
+                </a:tc>
+                <a:tc>
+                  <a:txBody>
+                    <a:bodyPr/>
+                    <a:lstStyle/>
+                    <a:p>
+                      <a:r>
+                        <a:rPr lang="it-IT" sz="1200" dirty="0"/>
+                        <a:t>Y</a:t>
+                      </a:r>
                     </a:p>
                   </a:txBody>
                   <a:tcPr/>
@@ -8282,20 +8282,20 @@
                     <a:bodyPr/>
                     <a:lstStyle/>
                     <a:p>
-                      <a:r>
-                        <a:rPr lang="it-IT" sz="1200" dirty="0"/>
-                        <a:t>30*5</a:t>
-                      </a:r>
-                    </a:p>
-                  </a:txBody>
-                  <a:tcPr/>
-                </a:tc>
-                <a:tc>
-                  <a:txBody>
-                    <a:bodyPr/>
-                    <a:lstStyle/>
-                    <a:p>
-                      <a:endParaRPr lang="it-IT" sz="1200" dirty="0"/>
+                      <a:endParaRPr lang="it-IT" sz="1200" dirty="0"/>
+                    </a:p>
+                  </a:txBody>
+                  <a:tcPr/>
+                </a:tc>
+                <a:tc>
+                  <a:txBody>
+                    <a:bodyPr/>
+                    <a:lstStyle/>
+                    <a:p>
+                      <a:r>
+                        <a:rPr lang="it-IT" sz="1200" dirty="0"/>
+                        <a:t>Y</a:t>
+                      </a:r>
                     </a:p>
                   </a:txBody>
                   <a:tcPr/>
@@ -8405,20 +8405,20 @@
                     <a:bodyPr/>
                     <a:lstStyle/>
                     <a:p>
-                      <a:r>
-                        <a:rPr lang="it-IT" sz="1200" dirty="0"/>
-                        <a:t>30*5</a:t>
-                      </a:r>
-                    </a:p>
-                  </a:txBody>
-                  <a:tcPr/>
-                </a:tc>
-                <a:tc>
-                  <a:txBody>
-                    <a:bodyPr/>
-                    <a:lstStyle/>
-                    <a:p>
-                      <a:endParaRPr lang="it-IT" sz="1200" dirty="0"/>
+                      <a:endParaRPr lang="it-IT" sz="1200" dirty="0"/>
+                    </a:p>
+                  </a:txBody>
+                  <a:tcPr/>
+                </a:tc>
+                <a:tc>
+                  <a:txBody>
+                    <a:bodyPr/>
+                    <a:lstStyle/>
+                    <a:p>
+                      <a:r>
+                        <a:rPr lang="it-IT" sz="1200" dirty="0"/>
+                        <a:t>Y</a:t>
+                      </a:r>
                     </a:p>
                   </a:txBody>
                   <a:tcPr/>
@@ -8524,14 +8524,14 @@
           <p:nvPr>
             <p:extLst>
               <p:ext uri="{D42A27DB-BD31-4B8C-83A1-F6EECF244321}">
-                <p14:modId xmlns:p14="http://schemas.microsoft.com/office/powerpoint/2010/main" val="1068091212"/>
+                <p14:modId xmlns:p14="http://schemas.microsoft.com/office/powerpoint/2010/main" val="3012431884"/>
               </p:ext>
             </p:extLst>
           </p:nvPr>
         </p:nvGraphicFramePr>
         <p:xfrm>
           <a:off x="487325" y="1005840"/>
-          <a:ext cx="11217349" cy="3108960"/>
+          <a:ext cx="11217349" cy="2926080"/>
         </p:xfrm>
         <a:graphic>
           <a:graphicData uri="http://schemas.openxmlformats.org/drawingml/2006/table">
@@ -9825,20 +9825,20 @@
                     <a:bodyPr/>
                     <a:lstStyle/>
                     <a:p>
-                      <a:r>
-                        <a:rPr lang="it-IT" sz="1200" dirty="0"/>
-                        <a:t>30*5</a:t>
-                      </a:r>
-                    </a:p>
-                  </a:txBody>
-                  <a:tcPr/>
-                </a:tc>
-                <a:tc>
-                  <a:txBody>
-                    <a:bodyPr/>
-                    <a:lstStyle/>
-                    <a:p>
-                      <a:endParaRPr lang="it-IT" sz="1200" dirty="0"/>
+                      <a:endParaRPr lang="it-IT" sz="1200" dirty="0"/>
+                    </a:p>
+                  </a:txBody>
+                  <a:tcPr/>
+                </a:tc>
+                <a:tc>
+                  <a:txBody>
+                    <a:bodyPr/>
+                    <a:lstStyle/>
+                    <a:p>
+                      <a:r>
+                        <a:rPr lang="it-IT" sz="1200" dirty="0"/>
+                        <a:t>Y</a:t>
+                      </a:r>
                     </a:p>
                   </a:txBody>
                   <a:tcPr/>
@@ -9948,20 +9948,20 @@
                     <a:bodyPr/>
                     <a:lstStyle/>
                     <a:p>
-                      <a:r>
-                        <a:rPr lang="it-IT" sz="1200" dirty="0"/>
-                        <a:t>30*5</a:t>
-                      </a:r>
-                    </a:p>
-                  </a:txBody>
-                  <a:tcPr/>
-                </a:tc>
-                <a:tc>
-                  <a:txBody>
-                    <a:bodyPr/>
-                    <a:lstStyle/>
-                    <a:p>
-                      <a:endParaRPr lang="it-IT" sz="1200" dirty="0"/>
+                      <a:endParaRPr lang="it-IT" sz="1200" dirty="0"/>
+                    </a:p>
+                  </a:txBody>
+                  <a:tcPr/>
+                </a:tc>
+                <a:tc>
+                  <a:txBody>
+                    <a:bodyPr/>
+                    <a:lstStyle/>
+                    <a:p>
+                      <a:r>
+                        <a:rPr lang="it-IT" sz="1200" dirty="0"/>
+                        <a:t>Y</a:t>
+                      </a:r>
                     </a:p>
                   </a:txBody>
                   <a:tcPr/>
@@ -10074,12 +10074,9 @@
                     <a:p>
                       <a:r>
                         <a:rPr lang="it-IT" sz="1200"/>
-                        <a:t>~ 1.5 </a:t>
-                      </a:r>
-                      <a:r>
-                        <a:rPr lang="it-IT" sz="1200" dirty="0"/>
-                        <a:t>days</a:t>
-                      </a:r>
+                        <a:t>~ 20h</a:t>
+                      </a:r>
+                      <a:endParaRPr lang="it-IT" sz="1200" dirty="0"/>
                     </a:p>
                   </a:txBody>
                   <a:tcPr/>

</xml_diff>

<commit_message>
last batch of results
</commit_message>
<xml_diff>
--- a/extra_material/exp_plan.pptx
+++ b/extra_material/exp_plan.pptx
@@ -262,7 +262,7 @@
           <a:p>
             <a:fld id="{D9DFC112-CD81-6544-BC9B-69B280E44EE3}" type="datetimeFigureOut">
               <a:rPr lang="it-IT" smtClean="0"/>
-              <a:t>25/03/25</a:t>
+              <a:t>26/03/25</a:t>
             </a:fld>
             <a:endParaRPr lang="it-IT"/>
           </a:p>
@@ -460,7 +460,7 @@
           <a:p>
             <a:fld id="{D9DFC112-CD81-6544-BC9B-69B280E44EE3}" type="datetimeFigureOut">
               <a:rPr lang="it-IT" smtClean="0"/>
-              <a:t>25/03/25</a:t>
+              <a:t>26/03/25</a:t>
             </a:fld>
             <a:endParaRPr lang="it-IT"/>
           </a:p>
@@ -668,7 +668,7 @@
           <a:p>
             <a:fld id="{D9DFC112-CD81-6544-BC9B-69B280E44EE3}" type="datetimeFigureOut">
               <a:rPr lang="it-IT" smtClean="0"/>
-              <a:t>25/03/25</a:t>
+              <a:t>26/03/25</a:t>
             </a:fld>
             <a:endParaRPr lang="it-IT"/>
           </a:p>
@@ -866,7 +866,7 @@
           <a:p>
             <a:fld id="{D9DFC112-CD81-6544-BC9B-69B280E44EE3}" type="datetimeFigureOut">
               <a:rPr lang="it-IT" smtClean="0"/>
-              <a:t>25/03/25</a:t>
+              <a:t>26/03/25</a:t>
             </a:fld>
             <a:endParaRPr lang="it-IT"/>
           </a:p>
@@ -1141,7 +1141,7 @@
           <a:p>
             <a:fld id="{D9DFC112-CD81-6544-BC9B-69B280E44EE3}" type="datetimeFigureOut">
               <a:rPr lang="it-IT" smtClean="0"/>
-              <a:t>25/03/25</a:t>
+              <a:t>26/03/25</a:t>
             </a:fld>
             <a:endParaRPr lang="it-IT"/>
           </a:p>
@@ -1406,7 +1406,7 @@
           <a:p>
             <a:fld id="{D9DFC112-CD81-6544-BC9B-69B280E44EE3}" type="datetimeFigureOut">
               <a:rPr lang="it-IT" smtClean="0"/>
-              <a:t>25/03/25</a:t>
+              <a:t>26/03/25</a:t>
             </a:fld>
             <a:endParaRPr lang="it-IT"/>
           </a:p>
@@ -1818,7 +1818,7 @@
           <a:p>
             <a:fld id="{D9DFC112-CD81-6544-BC9B-69B280E44EE3}" type="datetimeFigureOut">
               <a:rPr lang="it-IT" smtClean="0"/>
-              <a:t>25/03/25</a:t>
+              <a:t>26/03/25</a:t>
             </a:fld>
             <a:endParaRPr lang="it-IT"/>
           </a:p>
@@ -1959,7 +1959,7 @@
           <a:p>
             <a:fld id="{D9DFC112-CD81-6544-BC9B-69B280E44EE3}" type="datetimeFigureOut">
               <a:rPr lang="it-IT" smtClean="0"/>
-              <a:t>25/03/25</a:t>
+              <a:t>26/03/25</a:t>
             </a:fld>
             <a:endParaRPr lang="it-IT"/>
           </a:p>
@@ -2072,7 +2072,7 @@
           <a:p>
             <a:fld id="{D9DFC112-CD81-6544-BC9B-69B280E44EE3}" type="datetimeFigureOut">
               <a:rPr lang="it-IT" smtClean="0"/>
-              <a:t>25/03/25</a:t>
+              <a:t>26/03/25</a:t>
             </a:fld>
             <a:endParaRPr lang="it-IT"/>
           </a:p>
@@ -2383,7 +2383,7 @@
           <a:p>
             <a:fld id="{D9DFC112-CD81-6544-BC9B-69B280E44EE3}" type="datetimeFigureOut">
               <a:rPr lang="it-IT" smtClean="0"/>
-              <a:t>25/03/25</a:t>
+              <a:t>26/03/25</a:t>
             </a:fld>
             <a:endParaRPr lang="it-IT"/>
           </a:p>
@@ -2671,7 +2671,7 @@
           <a:p>
             <a:fld id="{D9DFC112-CD81-6544-BC9B-69B280E44EE3}" type="datetimeFigureOut">
               <a:rPr lang="it-IT" smtClean="0"/>
-              <a:t>25/03/25</a:t>
+              <a:t>26/03/25</a:t>
             </a:fld>
             <a:endParaRPr lang="it-IT"/>
           </a:p>
@@ -2912,7 +2912,7 @@
           <a:p>
             <a:fld id="{D9DFC112-CD81-6544-BC9B-69B280E44EE3}" type="datetimeFigureOut">
               <a:rPr lang="it-IT" smtClean="0"/>
-              <a:t>25/03/25</a:t>
+              <a:t>26/03/25</a:t>
             </a:fld>
             <a:endParaRPr lang="it-IT"/>
           </a:p>
@@ -3449,7 +3449,7 @@
           <p:nvPr>
             <p:extLst>
               <p:ext uri="{D42A27DB-BD31-4B8C-83A1-F6EECF244321}">
-                <p14:modId xmlns:p14="http://schemas.microsoft.com/office/powerpoint/2010/main" val="3890635759"/>
+                <p14:modId xmlns:p14="http://schemas.microsoft.com/office/powerpoint/2010/main" val="2948464111"/>
               </p:ext>
             </p:extLst>
           </p:nvPr>
@@ -4970,20 +4970,20 @@
                     <a:bodyPr/>
                     <a:lstStyle/>
                     <a:p>
-                      <a:r>
-                        <a:rPr lang="it-IT" sz="1200" dirty="0"/>
-                        <a:t>30*5</a:t>
-                      </a:r>
-                    </a:p>
-                  </a:txBody>
-                  <a:tcPr/>
-                </a:tc>
-                <a:tc>
-                  <a:txBody>
-                    <a:bodyPr/>
-                    <a:lstStyle/>
-                    <a:p>
-                      <a:endParaRPr lang="it-IT" sz="1200" dirty="0"/>
+                      <a:endParaRPr lang="it-IT" sz="1200" dirty="0"/>
+                    </a:p>
+                  </a:txBody>
+                  <a:tcPr/>
+                </a:tc>
+                <a:tc>
+                  <a:txBody>
+                    <a:bodyPr/>
+                    <a:lstStyle/>
+                    <a:p>
+                      <a:r>
+                        <a:rPr lang="it-IT" sz="1200" dirty="0"/>
+                        <a:t>Y</a:t>
+                      </a:r>
                     </a:p>
                   </a:txBody>
                   <a:tcPr/>
@@ -5093,20 +5093,20 @@
                     <a:bodyPr/>
                     <a:lstStyle/>
                     <a:p>
-                      <a:r>
-                        <a:rPr lang="it-IT" sz="1200" dirty="0"/>
-                        <a:t>30*5</a:t>
-                      </a:r>
-                    </a:p>
-                  </a:txBody>
-                  <a:tcPr/>
-                </a:tc>
-                <a:tc>
-                  <a:txBody>
-                    <a:bodyPr/>
-                    <a:lstStyle/>
-                    <a:p>
-                      <a:endParaRPr lang="it-IT" sz="1200" dirty="0"/>
+                      <a:endParaRPr lang="it-IT" sz="1200" dirty="0"/>
+                    </a:p>
+                  </a:txBody>
+                  <a:tcPr/>
+                </a:tc>
+                <a:tc>
+                  <a:txBody>
+                    <a:bodyPr/>
+                    <a:lstStyle/>
+                    <a:p>
+                      <a:r>
+                        <a:rPr lang="it-IT" sz="1200" dirty="0"/>
+                        <a:t>Y</a:t>
+                      </a:r>
                     </a:p>
                   </a:txBody>
                   <a:tcPr/>
@@ -5220,20 +5220,20 @@
                     <a:bodyPr/>
                     <a:lstStyle/>
                     <a:p>
-                      <a:r>
-                        <a:rPr lang="it-IT" sz="1200" dirty="0"/>
-                        <a:t>30*5</a:t>
-                      </a:r>
-                    </a:p>
-                  </a:txBody>
-                  <a:tcPr/>
-                </a:tc>
-                <a:tc>
-                  <a:txBody>
-                    <a:bodyPr/>
-                    <a:lstStyle/>
-                    <a:p>
-                      <a:endParaRPr lang="it-IT" sz="1200" dirty="0"/>
+                      <a:endParaRPr lang="it-IT" sz="1200" dirty="0"/>
+                    </a:p>
+                  </a:txBody>
+                  <a:tcPr/>
+                </a:tc>
+                <a:tc>
+                  <a:txBody>
+                    <a:bodyPr/>
+                    <a:lstStyle/>
+                    <a:p>
+                      <a:r>
+                        <a:rPr lang="it-IT" sz="1200" dirty="0"/>
+                        <a:t>Y</a:t>
+                      </a:r>
                     </a:p>
                   </a:txBody>
                   <a:tcPr/>
@@ -5343,20 +5343,20 @@
                     <a:bodyPr/>
                     <a:lstStyle/>
                     <a:p>
-                      <a:r>
-                        <a:rPr lang="it-IT" sz="1200" dirty="0"/>
-                        <a:t>30*5</a:t>
-                      </a:r>
-                    </a:p>
-                  </a:txBody>
-                  <a:tcPr/>
-                </a:tc>
-                <a:tc>
-                  <a:txBody>
-                    <a:bodyPr/>
-                    <a:lstStyle/>
-                    <a:p>
-                      <a:endParaRPr lang="it-IT" sz="1200" dirty="0"/>
+                      <a:endParaRPr lang="it-IT" sz="1200" dirty="0"/>
+                    </a:p>
+                  </a:txBody>
+                  <a:tcPr/>
+                </a:tc>
+                <a:tc>
+                  <a:txBody>
+                    <a:bodyPr/>
+                    <a:lstStyle/>
+                    <a:p>
+                      <a:r>
+                        <a:rPr lang="it-IT" sz="1200" dirty="0"/>
+                        <a:t>Y</a:t>
+                      </a:r>
                     </a:p>
                   </a:txBody>
                   <a:tcPr/>
@@ -5470,20 +5470,20 @@
                     <a:bodyPr/>
                     <a:lstStyle/>
                     <a:p>
-                      <a:r>
-                        <a:rPr lang="it-IT" sz="1200" dirty="0"/>
-                        <a:t>30*5</a:t>
-                      </a:r>
-                    </a:p>
-                  </a:txBody>
-                  <a:tcPr/>
-                </a:tc>
-                <a:tc>
-                  <a:txBody>
-                    <a:bodyPr/>
-                    <a:lstStyle/>
-                    <a:p>
-                      <a:endParaRPr lang="it-IT" sz="1200" dirty="0"/>
+                      <a:endParaRPr lang="it-IT" sz="1200" dirty="0"/>
+                    </a:p>
+                  </a:txBody>
+                  <a:tcPr/>
+                </a:tc>
+                <a:tc>
+                  <a:txBody>
+                    <a:bodyPr/>
+                    <a:lstStyle/>
+                    <a:p>
+                      <a:r>
+                        <a:rPr lang="it-IT" sz="1200" dirty="0"/>
+                        <a:t>Y</a:t>
+                      </a:r>
                     </a:p>
                   </a:txBody>
                   <a:tcPr/>
@@ -5593,20 +5593,20 @@
                     <a:bodyPr/>
                     <a:lstStyle/>
                     <a:p>
-                      <a:r>
-                        <a:rPr lang="it-IT" sz="1200" dirty="0"/>
-                        <a:t>30*5</a:t>
-                      </a:r>
-                    </a:p>
-                  </a:txBody>
-                  <a:tcPr/>
-                </a:tc>
-                <a:tc>
-                  <a:txBody>
-                    <a:bodyPr/>
-                    <a:lstStyle/>
-                    <a:p>
-                      <a:endParaRPr lang="it-IT" sz="1200" dirty="0"/>
+                      <a:endParaRPr lang="it-IT" sz="1200" dirty="0"/>
+                    </a:p>
+                  </a:txBody>
+                  <a:tcPr/>
+                </a:tc>
+                <a:tc>
+                  <a:txBody>
+                    <a:bodyPr/>
+                    <a:lstStyle/>
+                    <a:p>
+                      <a:r>
+                        <a:rPr lang="it-IT" sz="1200" dirty="0"/>
+                        <a:t>Y</a:t>
+                      </a:r>
                     </a:p>
                   </a:txBody>
                   <a:tcPr/>
@@ -5720,20 +5720,20 @@
                     <a:bodyPr/>
                     <a:lstStyle/>
                     <a:p>
-                      <a:r>
-                        <a:rPr lang="it-IT" sz="1200" dirty="0"/>
-                        <a:t>30*5</a:t>
-                      </a:r>
-                    </a:p>
-                  </a:txBody>
-                  <a:tcPr/>
-                </a:tc>
-                <a:tc>
-                  <a:txBody>
-                    <a:bodyPr/>
-                    <a:lstStyle/>
-                    <a:p>
-                      <a:endParaRPr lang="it-IT" sz="1200" dirty="0"/>
+                      <a:endParaRPr lang="it-IT" sz="1200" dirty="0"/>
+                    </a:p>
+                  </a:txBody>
+                  <a:tcPr/>
+                </a:tc>
+                <a:tc>
+                  <a:txBody>
+                    <a:bodyPr/>
+                    <a:lstStyle/>
+                    <a:p>
+                      <a:r>
+                        <a:rPr lang="it-IT" sz="1200" dirty="0"/>
+                        <a:t>Y</a:t>
+                      </a:r>
                     </a:p>
                   </a:txBody>
                   <a:tcPr/>
@@ -5843,20 +5843,20 @@
                     <a:bodyPr/>
                     <a:lstStyle/>
                     <a:p>
-                      <a:r>
-                        <a:rPr lang="it-IT" sz="1200" dirty="0"/>
-                        <a:t>30*5</a:t>
-                      </a:r>
-                    </a:p>
-                  </a:txBody>
-                  <a:tcPr/>
-                </a:tc>
-                <a:tc>
-                  <a:txBody>
-                    <a:bodyPr/>
-                    <a:lstStyle/>
-                    <a:p>
-                      <a:endParaRPr lang="it-IT" sz="1200" dirty="0"/>
+                      <a:endParaRPr lang="it-IT" sz="1200" dirty="0"/>
+                    </a:p>
+                  </a:txBody>
+                  <a:tcPr/>
+                </a:tc>
+                <a:tc>
+                  <a:txBody>
+                    <a:bodyPr/>
+                    <a:lstStyle/>
+                    <a:p>
+                      <a:r>
+                        <a:rPr lang="it-IT" sz="1200" dirty="0"/>
+                        <a:t>Y</a:t>
+                      </a:r>
                     </a:p>
                   </a:txBody>
                   <a:tcPr/>
@@ -8524,7 +8524,7 @@
           <p:nvPr>
             <p:extLst>
               <p:ext uri="{D42A27DB-BD31-4B8C-83A1-F6EECF244321}">
-                <p14:modId xmlns:p14="http://schemas.microsoft.com/office/powerpoint/2010/main" val="3012431884"/>
+                <p14:modId xmlns:p14="http://schemas.microsoft.com/office/powerpoint/2010/main" val="295418591"/>
               </p:ext>
             </p:extLst>
           </p:nvPr>
@@ -10074,7 +10074,7 @@
                     <a:p>
                       <a:r>
                         <a:rPr lang="it-IT" sz="1200"/>
-                        <a:t>~ 20h</a:t>
+                        <a:t>~ 0h</a:t>
                       </a:r>
                       <a:endParaRPr lang="it-IT" sz="1200" dirty="0"/>
                     </a:p>

</xml_diff>